<commit_message>
final version oft slides
</commit_message>
<xml_diff>
--- a/04-Service_Discovery-APIGateways/01-Service_Discovery.pptx
+++ b/04-Service_Discovery-APIGateways/01-Service_Discovery.pptx
@@ -5,7 +5,7 @@
     <p:sldMasterId id="2147483672" r:id="rId1"/>
   </p:sldMasterIdLst>
   <p:notesMasterIdLst>
-    <p:notesMasterId r:id="rId30"/>
+    <p:notesMasterId r:id="rId34"/>
   </p:notesMasterIdLst>
   <p:sldIdLst>
     <p:sldId id="256" r:id="rId2"/>
@@ -32,10 +32,14 @@
     <p:sldId id="280" r:id="rId23"/>
     <p:sldId id="281" r:id="rId24"/>
     <p:sldId id="282" r:id="rId25"/>
-    <p:sldId id="270" r:id="rId26"/>
-    <p:sldId id="272" r:id="rId27"/>
-    <p:sldId id="273" r:id="rId28"/>
-    <p:sldId id="283" r:id="rId29"/>
+    <p:sldId id="284" r:id="rId26"/>
+    <p:sldId id="285" r:id="rId27"/>
+    <p:sldId id="286" r:id="rId28"/>
+    <p:sldId id="287" r:id="rId29"/>
+    <p:sldId id="270" r:id="rId30"/>
+    <p:sldId id="272" r:id="rId31"/>
+    <p:sldId id="273" r:id="rId32"/>
+    <p:sldId id="283" r:id="rId33"/>
   </p:sldIdLst>
   <p:sldSz cx="9144000" cy="6858000" type="screen4x3"/>
   <p:notesSz cx="6858000" cy="9144000"/>
@@ -179,6 +183,14 @@
             <p14:sldId id="280"/>
             <p14:sldId id="281"/>
             <p14:sldId id="282"/>
+          </p14:sldIdLst>
+        </p14:section>
+        <p14:section name="Raft" id="{E39A66A6-FB85-46D9-B59A-7036E61C0950}">
+          <p14:sldIdLst>
+            <p14:sldId id="284"/>
+            <p14:sldId id="285"/>
+            <p14:sldId id="286"/>
+            <p14:sldId id="287"/>
           </p14:sldIdLst>
         </p14:section>
         <p14:section name="Consul architecture" id="{3523DE6A-ED91-480D-B4AC-7C491F4D3A52}">
@@ -5396,6 +5408,604 @@
           <p:cNvPr id="4" name="Titel 3">
             <a:extLst>
               <a:ext uri="{FF2B5EF4-FFF2-40B4-BE49-F238E27FC236}">
+                <a16:creationId xmlns:a16="http://schemas.microsoft.com/office/drawing/2014/main" id="{F1057325-E8DE-4F5B-8D97-E77B3637F159}"/>
+              </a:ext>
+            </a:extLst>
+          </p:cNvPr>
+          <p:cNvSpPr>
+            <a:spLocks noGrp="1"/>
+          </p:cNvSpPr>
+          <p:nvPr>
+            <p:ph type="title"/>
+          </p:nvPr>
+        </p:nvSpPr>
+        <p:spPr/>
+        <p:txBody>
+          <a:bodyPr/>
+          <a:lstStyle/>
+          <a:p>
+            <a:r>
+              <a:rPr lang="en-US" dirty="0"/>
+              <a:t>Raft consensus</a:t>
+            </a:r>
+          </a:p>
+        </p:txBody>
+      </p:sp>
+      <p:sp>
+        <p:nvSpPr>
+          <p:cNvPr id="5" name="Inhaltsplatzhalter 4">
+            <a:extLst>
+              <a:ext uri="{FF2B5EF4-FFF2-40B4-BE49-F238E27FC236}">
+                <a16:creationId xmlns:a16="http://schemas.microsoft.com/office/drawing/2014/main" id="{3C23F837-9E83-4C0F-82A9-EC16E3539548}"/>
+              </a:ext>
+            </a:extLst>
+          </p:cNvPr>
+          <p:cNvSpPr>
+            <a:spLocks noGrp="1"/>
+          </p:cNvSpPr>
+          <p:nvPr>
+            <p:ph idx="1"/>
+          </p:nvPr>
+        </p:nvSpPr>
+        <p:spPr>
+          <a:xfrm>
+            <a:off x="259374" y="1402915"/>
+            <a:ext cx="8697057" cy="4225989"/>
+          </a:xfrm>
+        </p:spPr>
+        <p:txBody>
+          <a:bodyPr/>
+          <a:lstStyle/>
+          <a:p>
+            <a:r>
+              <a:rPr lang="en-US" dirty="0"/>
+              <a:t>Designed as an easier alternative to </a:t>
+            </a:r>
+            <a:r>
+              <a:rPr lang="en-US" dirty="0" err="1"/>
+              <a:t>Paxos</a:t>
+            </a:r>
+            <a:endParaRPr lang="en-US" dirty="0"/>
+          </a:p>
+          <a:p>
+            <a:r>
+              <a:rPr lang="en-US" dirty="0"/>
+              <a:t>Uses leader election to achieve consensus</a:t>
+            </a:r>
+          </a:p>
+          <a:p>
+            <a:r>
+              <a:rPr lang="en-US" dirty="0"/>
+              <a:t>Models a distributed state machine</a:t>
+            </a:r>
+          </a:p>
+          <a:p>
+            <a:pPr lvl="1"/>
+            <a:r>
+              <a:rPr lang="en-US" dirty="0"/>
+              <a:t>Every node is a state machine</a:t>
+            </a:r>
+          </a:p>
+          <a:p>
+            <a:pPr lvl="1"/>
+            <a:r>
+              <a:rPr lang="en-US" dirty="0"/>
+              <a:t>All nodes have to apply the same commands in the same order to stay in sync (same resulting state/transition)</a:t>
+            </a:r>
+          </a:p>
+          <a:p>
+            <a:r>
+              <a:rPr lang="en-US" dirty="0"/>
+              <a:t>Just one leader in a Raft cluster, all other nodes are followers</a:t>
+            </a:r>
+          </a:p>
+          <a:p>
+            <a:r>
+              <a:rPr lang="en-US" dirty="0"/>
+              <a:t>Leader is responsible for the log replication to all followers</a:t>
+            </a:r>
+          </a:p>
+          <a:p>
+            <a:r>
+              <a:rPr lang="en-US" dirty="0"/>
+              <a:t>Followers are expecting a heartbeat within a given timeout otherwise they suspect the leader failing</a:t>
+            </a:r>
+          </a:p>
+          <a:p>
+            <a:r>
+              <a:rPr lang="en-US" dirty="0"/>
+              <a:t>If a leader fails a new leader is elected</a:t>
+            </a:r>
+          </a:p>
+        </p:txBody>
+      </p:sp>
+      <p:sp>
+        <p:nvSpPr>
+          <p:cNvPr id="6" name="Textfeld 5">
+            <a:extLst>
+              <a:ext uri="{FF2B5EF4-FFF2-40B4-BE49-F238E27FC236}">
+                <a16:creationId xmlns:a16="http://schemas.microsoft.com/office/drawing/2014/main" id="{9D9022BD-C420-4005-B440-D84B9702326E}"/>
+              </a:ext>
+            </a:extLst>
+          </p:cNvPr>
+          <p:cNvSpPr txBox="1"/>
+          <p:nvPr/>
+        </p:nvSpPr>
+        <p:spPr>
+          <a:xfrm>
+            <a:off x="259374" y="6010242"/>
+            <a:ext cx="4583876" cy="369332"/>
+          </a:xfrm>
+          <a:prstGeom prst="rect">
+            <a:avLst/>
+          </a:prstGeom>
+          <a:noFill/>
+        </p:spPr>
+        <p:txBody>
+          <a:bodyPr wrap="square" rtlCol="0">
+            <a:spAutoFit/>
+          </a:bodyPr>
+          <a:lstStyle/>
+          <a:p>
+            <a:r>
+              <a:rPr lang="en-US" dirty="0"/>
+              <a:t>Visualization:</a:t>
+            </a:r>
+            <a:r>
+              <a:rPr lang="en-US" dirty="0">
+                <a:hlinkClick r:id="rId2"/>
+              </a:rPr>
+              <a:t> https://raft.github.io/</a:t>
+            </a:r>
+            <a:endParaRPr lang="en-US" dirty="0"/>
+          </a:p>
+        </p:txBody>
+      </p:sp>
+    </p:spTree>
+    <p:extLst>
+      <p:ext uri="{BB962C8B-B14F-4D97-AF65-F5344CB8AC3E}">
+        <p14:creationId xmlns:p14="http://schemas.microsoft.com/office/powerpoint/2010/main" val="4015628883"/>
+      </p:ext>
+    </p:extLst>
+  </p:cSld>
+  <p:clrMapOvr>
+    <a:masterClrMapping/>
+  </p:clrMapOvr>
+</p:sld>
+</file>
+
+<file path=ppt/slides/slide26.xml><?xml version="1.0" encoding="utf-8"?>
+<p:sld xmlns:a="http://schemas.openxmlformats.org/drawingml/2006/main" xmlns:r="http://schemas.openxmlformats.org/officeDocument/2006/relationships" xmlns:p="http://schemas.openxmlformats.org/presentationml/2006/main">
+  <p:cSld>
+    <p:spTree>
+      <p:nvGrpSpPr>
+        <p:cNvPr id="1" name=""/>
+        <p:cNvGrpSpPr/>
+        <p:nvPr/>
+      </p:nvGrpSpPr>
+      <p:grpSpPr>
+        <a:xfrm>
+          <a:off x="0" y="0"/>
+          <a:ext cx="0" cy="0"/>
+          <a:chOff x="0" y="0"/>
+          <a:chExt cx="0" cy="0"/>
+        </a:xfrm>
+      </p:grpSpPr>
+      <p:sp>
+        <p:nvSpPr>
+          <p:cNvPr id="4" name="Titel 3">
+            <a:extLst>
+              <a:ext uri="{FF2B5EF4-FFF2-40B4-BE49-F238E27FC236}">
+                <a16:creationId xmlns:a16="http://schemas.microsoft.com/office/drawing/2014/main" id="{5261E491-9753-4C4B-90AB-12D86C796505}"/>
+              </a:ext>
+            </a:extLst>
+          </p:cNvPr>
+          <p:cNvSpPr>
+            <a:spLocks noGrp="1"/>
+          </p:cNvSpPr>
+          <p:nvPr>
+            <p:ph type="title"/>
+          </p:nvPr>
+        </p:nvSpPr>
+        <p:spPr/>
+        <p:txBody>
+          <a:bodyPr/>
+          <a:lstStyle/>
+          <a:p>
+            <a:r>
+              <a:rPr lang="en-US" dirty="0"/>
+              <a:t>Raft leader election</a:t>
+            </a:r>
+          </a:p>
+        </p:txBody>
+      </p:sp>
+      <p:sp>
+        <p:nvSpPr>
+          <p:cNvPr id="5" name="Inhaltsplatzhalter 4">
+            <a:extLst>
+              <a:ext uri="{FF2B5EF4-FFF2-40B4-BE49-F238E27FC236}">
+                <a16:creationId xmlns:a16="http://schemas.microsoft.com/office/drawing/2014/main" id="{F5E818FF-D691-45FB-9FBC-F2D9CB414CC8}"/>
+              </a:ext>
+            </a:extLst>
+          </p:cNvPr>
+          <p:cNvSpPr>
+            <a:spLocks noGrp="1"/>
+          </p:cNvSpPr>
+          <p:nvPr>
+            <p:ph idx="1"/>
+          </p:nvPr>
+        </p:nvSpPr>
+        <p:spPr/>
+        <p:txBody>
+          <a:bodyPr/>
+          <a:lstStyle/>
+          <a:p>
+            <a:r>
+              <a:rPr lang="en-US" dirty="0"/>
+              <a:t>Leader election is started by a candidate server (a server that wasn’t contacted by the leader within the timeout period)</a:t>
+            </a:r>
+          </a:p>
+          <a:p>
+            <a:r>
+              <a:rPr lang="en-US" dirty="0"/>
+              <a:t>Candidate increments the term number (serial for periods where a leader was elected) and proposes itself as the new leader and sends a message to all other servers requesting their vote</a:t>
+            </a:r>
+          </a:p>
+          <a:p>
+            <a:r>
+              <a:rPr lang="en-US" dirty="0"/>
+              <a:t>If candidate gets a response with a term number at least as large as his current term number the election is defeated and the candidate is switching in follower mode</a:t>
+            </a:r>
+          </a:p>
+          <a:p>
+            <a:r>
+              <a:rPr lang="en-US" dirty="0"/>
+              <a:t>If the candidate server gets a majority of votes he’s getting the new leader</a:t>
+            </a:r>
+          </a:p>
+          <a:p>
+            <a:r>
+              <a:rPr lang="en-US" dirty="0"/>
+              <a:t>If neither happens (split vote) a new term is getting started (resulting in a new election)</a:t>
+            </a:r>
+          </a:p>
+        </p:txBody>
+      </p:sp>
+    </p:spTree>
+    <p:extLst>
+      <p:ext uri="{BB962C8B-B14F-4D97-AF65-F5344CB8AC3E}">
+        <p14:creationId xmlns:p14="http://schemas.microsoft.com/office/powerpoint/2010/main" val="3611440104"/>
+      </p:ext>
+    </p:extLst>
+  </p:cSld>
+  <p:clrMapOvr>
+    <a:masterClrMapping/>
+  </p:clrMapOvr>
+</p:sld>
+</file>
+
+<file path=ppt/slides/slide27.xml><?xml version="1.0" encoding="utf-8"?>
+<p:sld xmlns:a="http://schemas.openxmlformats.org/drawingml/2006/main" xmlns:r="http://schemas.openxmlformats.org/officeDocument/2006/relationships" xmlns:p="http://schemas.openxmlformats.org/presentationml/2006/main">
+  <p:cSld>
+    <p:spTree>
+      <p:nvGrpSpPr>
+        <p:cNvPr id="1" name=""/>
+        <p:cNvGrpSpPr/>
+        <p:nvPr/>
+      </p:nvGrpSpPr>
+      <p:grpSpPr>
+        <a:xfrm>
+          <a:off x="0" y="0"/>
+          <a:ext cx="0" cy="0"/>
+          <a:chOff x="0" y="0"/>
+          <a:chExt cx="0" cy="0"/>
+        </a:xfrm>
+      </p:grpSpPr>
+      <p:sp>
+        <p:nvSpPr>
+          <p:cNvPr id="4" name="Titel 3">
+            <a:extLst>
+              <a:ext uri="{FF2B5EF4-FFF2-40B4-BE49-F238E27FC236}">
+                <a16:creationId xmlns:a16="http://schemas.microsoft.com/office/drawing/2014/main" id="{4104C2C2-2138-49D1-B561-2AB6F197E163}"/>
+              </a:ext>
+            </a:extLst>
+          </p:cNvPr>
+          <p:cNvSpPr>
+            <a:spLocks noGrp="1"/>
+          </p:cNvSpPr>
+          <p:nvPr>
+            <p:ph type="title"/>
+          </p:nvPr>
+        </p:nvSpPr>
+        <p:spPr/>
+        <p:txBody>
+          <a:bodyPr/>
+          <a:lstStyle/>
+          <a:p>
+            <a:r>
+              <a:rPr lang="en-US" dirty="0"/>
+              <a:t>Log replication</a:t>
+            </a:r>
+          </a:p>
+        </p:txBody>
+      </p:sp>
+      <p:sp>
+        <p:nvSpPr>
+          <p:cNvPr id="5" name="Inhaltsplatzhalter 4">
+            <a:extLst>
+              <a:ext uri="{FF2B5EF4-FFF2-40B4-BE49-F238E27FC236}">
+                <a16:creationId xmlns:a16="http://schemas.microsoft.com/office/drawing/2014/main" id="{791FCA1A-2DDF-4A16-BFAF-D09A894DCCD9}"/>
+              </a:ext>
+            </a:extLst>
+          </p:cNvPr>
+          <p:cNvSpPr>
+            <a:spLocks noGrp="1"/>
+          </p:cNvSpPr>
+          <p:nvPr>
+            <p:ph idx="1"/>
+          </p:nvPr>
+        </p:nvSpPr>
+        <p:spPr/>
+        <p:txBody>
+          <a:bodyPr/>
+          <a:lstStyle/>
+          <a:p>
+            <a:r>
+              <a:rPr lang="en-US" dirty="0"/>
+              <a:t>Leader replicates received requests (commands for the state machine) to all followers</a:t>
+            </a:r>
+          </a:p>
+          <a:p>
+            <a:r>
+              <a:rPr lang="en-US" dirty="0"/>
+              <a:t>Leader appends the command to his log as a new entry and sends a </a:t>
+            </a:r>
+            <a:r>
+              <a:rPr lang="en-US" i="1" dirty="0" err="1"/>
+              <a:t>AppendEntry</a:t>
+            </a:r>
+            <a:r>
+              <a:rPr lang="en-US" dirty="0"/>
+              <a:t> to the followers</a:t>
+            </a:r>
+          </a:p>
+          <a:p>
+            <a:r>
+              <a:rPr lang="en-US" dirty="0"/>
+              <a:t>When the leader receives confirmation of a majority of his followers he applies the entry to his state machine (request is considered </a:t>
+            </a:r>
+            <a:r>
+              <a:rPr lang="en-US" i="1" dirty="0"/>
+              <a:t>committed</a:t>
+            </a:r>
+            <a:r>
+              <a:rPr lang="en-US" dirty="0"/>
+              <a:t> )</a:t>
+            </a:r>
+          </a:p>
+          <a:p>
+            <a:r>
+              <a:rPr lang="en-US" dirty="0"/>
+              <a:t>When a follower learns that an entry was applied by the leader he applies the entry to his local state machine</a:t>
+            </a:r>
+          </a:p>
+          <a:p>
+            <a:r>
+              <a:rPr lang="en-US" dirty="0"/>
+              <a:t>In case of a leader crash the new leader enforces a replication of his log to all followers. To get a consistent state the leader compares his log with every log of the followers, takes the latest where they agree and replaces all following entries with his own</a:t>
+            </a:r>
+          </a:p>
+        </p:txBody>
+      </p:sp>
+    </p:spTree>
+    <p:extLst>
+      <p:ext uri="{BB962C8B-B14F-4D97-AF65-F5344CB8AC3E}">
+        <p14:creationId xmlns:p14="http://schemas.microsoft.com/office/powerpoint/2010/main" val="2678069398"/>
+      </p:ext>
+    </p:extLst>
+  </p:cSld>
+  <p:clrMapOvr>
+    <a:masterClrMapping/>
+  </p:clrMapOvr>
+</p:sld>
+</file>
+
+<file path=ppt/slides/slide28.xml><?xml version="1.0" encoding="utf-8"?>
+<p:sld xmlns:a="http://schemas.openxmlformats.org/drawingml/2006/main" xmlns:r="http://schemas.openxmlformats.org/officeDocument/2006/relationships" xmlns:p="http://schemas.openxmlformats.org/presentationml/2006/main">
+  <p:cSld>
+    <p:spTree>
+      <p:nvGrpSpPr>
+        <p:cNvPr id="1" name=""/>
+        <p:cNvGrpSpPr/>
+        <p:nvPr/>
+      </p:nvGrpSpPr>
+      <p:grpSpPr>
+        <a:xfrm>
+          <a:off x="0" y="0"/>
+          <a:ext cx="0" cy="0"/>
+          <a:chOff x="0" y="0"/>
+          <a:chExt cx="0" cy="0"/>
+        </a:xfrm>
+      </p:grpSpPr>
+      <p:sp>
+        <p:nvSpPr>
+          <p:cNvPr id="4" name="Titel 3">
+            <a:extLst>
+              <a:ext uri="{FF2B5EF4-FFF2-40B4-BE49-F238E27FC236}">
+                <a16:creationId xmlns:a16="http://schemas.microsoft.com/office/drawing/2014/main" id="{185D5D78-6525-441F-B478-7B7FEAB02040}"/>
+              </a:ext>
+            </a:extLst>
+          </p:cNvPr>
+          <p:cNvSpPr>
+            <a:spLocks noGrp="1"/>
+          </p:cNvSpPr>
+          <p:nvPr>
+            <p:ph type="title"/>
+          </p:nvPr>
+        </p:nvSpPr>
+        <p:spPr/>
+        <p:txBody>
+          <a:bodyPr/>
+          <a:lstStyle/>
+          <a:p>
+            <a:r>
+              <a:rPr lang="en-US" dirty="0"/>
+              <a:t>Raft – safety rules</a:t>
+            </a:r>
+          </a:p>
+        </p:txBody>
+      </p:sp>
+      <p:sp>
+        <p:nvSpPr>
+          <p:cNvPr id="5" name="Inhaltsplatzhalter 4">
+            <a:extLst>
+              <a:ext uri="{FF2B5EF4-FFF2-40B4-BE49-F238E27FC236}">
+                <a16:creationId xmlns:a16="http://schemas.microsoft.com/office/drawing/2014/main" id="{76DCB89E-F577-4A62-90C6-59C7E6A3E063}"/>
+              </a:ext>
+            </a:extLst>
+          </p:cNvPr>
+          <p:cNvSpPr>
+            <a:spLocks noGrp="1"/>
+          </p:cNvSpPr>
+          <p:nvPr>
+            <p:ph idx="1"/>
+          </p:nvPr>
+        </p:nvSpPr>
+        <p:spPr>
+          <a:xfrm>
+            <a:off x="259374" y="1402915"/>
+            <a:ext cx="8697057" cy="4119111"/>
+          </a:xfrm>
+        </p:spPr>
+        <p:txBody>
+          <a:bodyPr/>
+          <a:lstStyle/>
+          <a:p>
+            <a:r>
+              <a:rPr lang="en-US" b="1" dirty="0"/>
+              <a:t>Election safety </a:t>
+            </a:r>
+            <a:r>
+              <a:rPr lang="en-US" dirty="0"/>
+              <a:t>(at most one leader can be elected in a given term)</a:t>
+            </a:r>
+            <a:endParaRPr lang="en-US" b="1" dirty="0"/>
+          </a:p>
+          <a:p>
+            <a:r>
+              <a:rPr lang="en-US" b="1" dirty="0"/>
+              <a:t>Leader Append-Only </a:t>
+            </a:r>
+            <a:r>
+              <a:rPr lang="en-US" dirty="0"/>
+              <a:t>(a leader can only append new entries to its logs - it can neither overwrite nor delete entries)</a:t>
+            </a:r>
+          </a:p>
+          <a:p>
+            <a:r>
+              <a:rPr lang="en-US" b="1" dirty="0"/>
+              <a:t>Log Matching</a:t>
+            </a:r>
+            <a:r>
+              <a:rPr lang="en-US" dirty="0"/>
+              <a:t> (if two logs contain an entry with the same index and term, then the logs are identical in all entries up through the given index)</a:t>
+            </a:r>
+          </a:p>
+          <a:p>
+            <a:r>
+              <a:rPr lang="en-US" b="1" dirty="0"/>
+              <a:t>Leader Completeness</a:t>
+            </a:r>
+            <a:r>
+              <a:rPr lang="en-US" dirty="0"/>
+              <a:t> (if a log entry is committed in a given term then it will be present in the logs of the leaders since this term)</a:t>
+            </a:r>
+          </a:p>
+          <a:p>
+            <a:r>
+              <a:rPr lang="en-US" b="1" dirty="0"/>
+              <a:t>State Machine Safety </a:t>
+            </a:r>
+            <a:r>
+              <a:rPr lang="en-US" dirty="0"/>
+              <a:t>( if a server has applied a particular log entry to its state machine, then no other server may apply a different command for the same log)</a:t>
+            </a:r>
+          </a:p>
+        </p:txBody>
+      </p:sp>
+      <p:sp>
+        <p:nvSpPr>
+          <p:cNvPr id="6" name="Textfeld 5">
+            <a:extLst>
+              <a:ext uri="{FF2B5EF4-FFF2-40B4-BE49-F238E27FC236}">
+                <a16:creationId xmlns:a16="http://schemas.microsoft.com/office/drawing/2014/main" id="{72BC7F6D-45C6-4608-9AAB-93E49A3C3B98}"/>
+              </a:ext>
+            </a:extLst>
+          </p:cNvPr>
+          <p:cNvSpPr txBox="1"/>
+          <p:nvPr/>
+        </p:nvSpPr>
+        <p:spPr>
+          <a:xfrm>
+            <a:off x="259374" y="6056416"/>
+            <a:ext cx="8229600" cy="369332"/>
+          </a:xfrm>
+          <a:prstGeom prst="rect">
+            <a:avLst/>
+          </a:prstGeom>
+          <a:noFill/>
+        </p:spPr>
+        <p:txBody>
+          <a:bodyPr wrap="square" rtlCol="0">
+            <a:spAutoFit/>
+          </a:bodyPr>
+          <a:lstStyle/>
+          <a:p>
+            <a:r>
+              <a:rPr lang="en-US" dirty="0">
+                <a:hlinkClick r:id="rId2"/>
+              </a:rPr>
+              <a:t>https://en.wikipedia.org/wiki/Raft_(computer_science)</a:t>
+            </a:r>
+            <a:endParaRPr lang="en-US" dirty="0"/>
+          </a:p>
+        </p:txBody>
+      </p:sp>
+    </p:spTree>
+    <p:extLst>
+      <p:ext uri="{BB962C8B-B14F-4D97-AF65-F5344CB8AC3E}">
+        <p14:creationId xmlns:p14="http://schemas.microsoft.com/office/powerpoint/2010/main" val="911632533"/>
+      </p:ext>
+    </p:extLst>
+  </p:cSld>
+  <p:clrMapOvr>
+    <a:masterClrMapping/>
+  </p:clrMapOvr>
+</p:sld>
+</file>
+
+<file path=ppt/slides/slide29.xml><?xml version="1.0" encoding="utf-8"?>
+<p:sld xmlns:a="http://schemas.openxmlformats.org/drawingml/2006/main" xmlns:r="http://schemas.openxmlformats.org/officeDocument/2006/relationships" xmlns:p="http://schemas.openxmlformats.org/presentationml/2006/main">
+  <p:cSld>
+    <p:spTree>
+      <p:nvGrpSpPr>
+        <p:cNvPr id="1" name=""/>
+        <p:cNvGrpSpPr/>
+        <p:nvPr/>
+      </p:nvGrpSpPr>
+      <p:grpSpPr>
+        <a:xfrm>
+          <a:off x="0" y="0"/>
+          <a:ext cx="0" cy="0"/>
+          <a:chOff x="0" y="0"/>
+          <a:chExt cx="0" cy="0"/>
+        </a:xfrm>
+      </p:grpSpPr>
+      <p:sp>
+        <p:nvSpPr>
+          <p:cNvPr id="4" name="Titel 3">
+            <a:extLst>
+              <a:ext uri="{FF2B5EF4-FFF2-40B4-BE49-F238E27FC236}">
                 <a16:creationId xmlns:a16="http://schemas.microsoft.com/office/drawing/2014/main" id="{BD4843DF-CCA1-490D-B901-991BF24870F7}"/>
               </a:ext>
             </a:extLst>
@@ -5481,7 +6091,195 @@
 </p:sld>
 </file>
 
-<file path=ppt/slides/slide26.xml><?xml version="1.0" encoding="utf-8"?>
+<file path=ppt/slides/slide3.xml><?xml version="1.0" encoding="utf-8"?>
+<p:sld xmlns:a="http://schemas.openxmlformats.org/drawingml/2006/main" xmlns:r="http://schemas.openxmlformats.org/officeDocument/2006/relationships" xmlns:p="http://schemas.openxmlformats.org/presentationml/2006/main">
+  <p:cSld>
+    <p:spTree>
+      <p:nvGrpSpPr>
+        <p:cNvPr id="1" name=""/>
+        <p:cNvGrpSpPr/>
+        <p:nvPr/>
+      </p:nvGrpSpPr>
+      <p:grpSpPr>
+        <a:xfrm>
+          <a:off x="0" y="0"/>
+          <a:ext cx="0" cy="0"/>
+          <a:chOff x="0" y="0"/>
+          <a:chExt cx="0" cy="0"/>
+        </a:xfrm>
+      </p:grpSpPr>
+      <p:sp>
+        <p:nvSpPr>
+          <p:cNvPr id="4" name="Titel 3">
+            <a:extLst>
+              <a:ext uri="{FF2B5EF4-FFF2-40B4-BE49-F238E27FC236}">
+                <a16:creationId xmlns:a16="http://schemas.microsoft.com/office/drawing/2014/main" id="{4DADE15A-3A03-4CB3-A3A9-2A409B206270}"/>
+              </a:ext>
+            </a:extLst>
+          </p:cNvPr>
+          <p:cNvSpPr>
+            <a:spLocks noGrp="1"/>
+          </p:cNvSpPr>
+          <p:nvPr>
+            <p:ph type="title"/>
+          </p:nvPr>
+        </p:nvSpPr>
+        <p:spPr/>
+        <p:txBody>
+          <a:bodyPr/>
+          <a:lstStyle/>
+          <a:p>
+            <a:r>
+              <a:rPr lang="en-US" dirty="0"/>
+              <a:t>Introduction</a:t>
+            </a:r>
+          </a:p>
+        </p:txBody>
+      </p:sp>
+      <p:sp>
+        <p:nvSpPr>
+          <p:cNvPr id="5" name="Inhaltsplatzhalter 4">
+            <a:extLst>
+              <a:ext uri="{FF2B5EF4-FFF2-40B4-BE49-F238E27FC236}">
+                <a16:creationId xmlns:a16="http://schemas.microsoft.com/office/drawing/2014/main" id="{164AC5CF-10EE-4132-86BF-F193601083EE}"/>
+              </a:ext>
+            </a:extLst>
+          </p:cNvPr>
+          <p:cNvSpPr>
+            <a:spLocks noGrp="1"/>
+          </p:cNvSpPr>
+          <p:nvPr>
+            <p:ph idx="1"/>
+          </p:nvPr>
+        </p:nvSpPr>
+        <p:spPr/>
+        <p:txBody>
+          <a:bodyPr/>
+          <a:lstStyle/>
+          <a:p>
+            <a:r>
+              <a:rPr lang="en-US" dirty="0"/>
+              <a:t>Service discovery can be used for many tasks:</a:t>
+            </a:r>
+          </a:p>
+          <a:p>
+            <a:pPr lvl="1"/>
+            <a:r>
+              <a:rPr lang="en-US" dirty="0"/>
+              <a:t>Service resolution for cross service communication</a:t>
+            </a:r>
+          </a:p>
+          <a:p>
+            <a:pPr lvl="1"/>
+            <a:r>
+              <a:rPr lang="en-US" dirty="0"/>
+              <a:t>Dynamic load balancing configuration</a:t>
+            </a:r>
+          </a:p>
+          <a:p>
+            <a:pPr lvl="1"/>
+            <a:r>
+              <a:rPr lang="en-US" dirty="0"/>
+              <a:t>Dynamic monitoring configuration</a:t>
+            </a:r>
+          </a:p>
+          <a:p>
+            <a:pPr lvl="1"/>
+            <a:r>
+              <a:rPr lang="en-US" dirty="0"/>
+              <a:t>…</a:t>
+            </a:r>
+          </a:p>
+          <a:p>
+            <a:r>
+              <a:rPr lang="en-US" dirty="0"/>
+              <a:t>Approaches:</a:t>
+            </a:r>
+          </a:p>
+          <a:p>
+            <a:pPr lvl="1"/>
+            <a:r>
+              <a:rPr lang="en-US" dirty="0"/>
+              <a:t>Static configuration files (forget about this…)</a:t>
+            </a:r>
+          </a:p>
+          <a:p>
+            <a:pPr lvl="1"/>
+            <a:r>
+              <a:rPr lang="en-US" dirty="0"/>
+              <a:t>DNS</a:t>
+            </a:r>
+          </a:p>
+          <a:p>
+            <a:pPr lvl="1"/>
+            <a:r>
+              <a:rPr lang="en-US" dirty="0"/>
+              <a:t>Dynamic solutions</a:t>
+            </a:r>
+          </a:p>
+          <a:p>
+            <a:r>
+              <a:rPr lang="en-US" dirty="0"/>
+              <a:t>Patterns:</a:t>
+            </a:r>
+          </a:p>
+          <a:p>
+            <a:pPr lvl="1"/>
+            <a:r>
+              <a:rPr lang="en-US" dirty="0"/>
+              <a:t>Client-side discovery</a:t>
+            </a:r>
+          </a:p>
+          <a:p>
+            <a:pPr lvl="1"/>
+            <a:r>
+              <a:rPr lang="en-US" dirty="0"/>
+              <a:t>Server-side discovery</a:t>
+            </a:r>
+          </a:p>
+          <a:p>
+            <a:r>
+              <a:rPr lang="en-US" dirty="0"/>
+              <a:t>Additionally a few products also include:</a:t>
+            </a:r>
+          </a:p>
+          <a:p>
+            <a:pPr lvl="1"/>
+            <a:r>
+              <a:rPr lang="en-US" dirty="0"/>
+              <a:t>Configuration stores</a:t>
+            </a:r>
+          </a:p>
+          <a:p>
+            <a:pPr lvl="1"/>
+            <a:r>
+              <a:rPr lang="en-US" dirty="0"/>
+              <a:t>Health checks (basically a kind of monitoring)</a:t>
+            </a:r>
+          </a:p>
+          <a:p>
+            <a:pPr lvl="1"/>
+            <a:r>
+              <a:rPr lang="en-US" dirty="0"/>
+              <a:t>Events on changes (e.g. new services, changes in the configuration store…)</a:t>
+            </a:r>
+          </a:p>
+        </p:txBody>
+      </p:sp>
+    </p:spTree>
+    <p:extLst>
+      <p:ext uri="{BB962C8B-B14F-4D97-AF65-F5344CB8AC3E}">
+        <p14:creationId xmlns:p14="http://schemas.microsoft.com/office/powerpoint/2010/main" val="3383403927"/>
+      </p:ext>
+    </p:extLst>
+  </p:cSld>
+  <p:clrMapOvr>
+    <a:masterClrMapping/>
+  </p:clrMapOvr>
+</p:sld>
+</file>
+
+<file path=ppt/slides/slide30.xml><?xml version="1.0" encoding="utf-8"?>
 <p:sld xmlns:a="http://schemas.openxmlformats.org/drawingml/2006/main" xmlns:r="http://schemas.openxmlformats.org/officeDocument/2006/relationships" xmlns:p="http://schemas.openxmlformats.org/presentationml/2006/main">
   <p:cSld>
     <p:spTree>
@@ -5763,7 +6561,7 @@
 </p:sld>
 </file>
 
-<file path=ppt/slides/slide27.xml><?xml version="1.0" encoding="utf-8"?>
+<file path=ppt/slides/slide31.xml><?xml version="1.0" encoding="utf-8"?>
 <p:sld xmlns:a="http://schemas.openxmlformats.org/drawingml/2006/main" xmlns:r="http://schemas.openxmlformats.org/officeDocument/2006/relationships" xmlns:p="http://schemas.openxmlformats.org/presentationml/2006/main">
   <p:cSld>
     <p:spTree>
@@ -5936,7 +6734,7 @@
 </p:sld>
 </file>
 
-<file path=ppt/slides/slide28.xml><?xml version="1.0" encoding="utf-8"?>
+<file path=ppt/slides/slide32.xml><?xml version="1.0" encoding="utf-8"?>
 <p:sld xmlns:a="http://schemas.openxmlformats.org/drawingml/2006/main" xmlns:r="http://schemas.openxmlformats.org/officeDocument/2006/relationships" xmlns:p="http://schemas.openxmlformats.org/presentationml/2006/main">
   <p:cSld>
     <p:spTree>
@@ -6137,194 +6935,6 @@
     <p:extLst>
       <p:ext uri="{BB962C8B-B14F-4D97-AF65-F5344CB8AC3E}">
         <p14:creationId xmlns:p14="http://schemas.microsoft.com/office/powerpoint/2010/main" val="3215109356"/>
-      </p:ext>
-    </p:extLst>
-  </p:cSld>
-  <p:clrMapOvr>
-    <a:masterClrMapping/>
-  </p:clrMapOvr>
-</p:sld>
-</file>
-
-<file path=ppt/slides/slide3.xml><?xml version="1.0" encoding="utf-8"?>
-<p:sld xmlns:a="http://schemas.openxmlformats.org/drawingml/2006/main" xmlns:r="http://schemas.openxmlformats.org/officeDocument/2006/relationships" xmlns:p="http://schemas.openxmlformats.org/presentationml/2006/main">
-  <p:cSld>
-    <p:spTree>
-      <p:nvGrpSpPr>
-        <p:cNvPr id="1" name=""/>
-        <p:cNvGrpSpPr/>
-        <p:nvPr/>
-      </p:nvGrpSpPr>
-      <p:grpSpPr>
-        <a:xfrm>
-          <a:off x="0" y="0"/>
-          <a:ext cx="0" cy="0"/>
-          <a:chOff x="0" y="0"/>
-          <a:chExt cx="0" cy="0"/>
-        </a:xfrm>
-      </p:grpSpPr>
-      <p:sp>
-        <p:nvSpPr>
-          <p:cNvPr id="4" name="Titel 3">
-            <a:extLst>
-              <a:ext uri="{FF2B5EF4-FFF2-40B4-BE49-F238E27FC236}">
-                <a16:creationId xmlns:a16="http://schemas.microsoft.com/office/drawing/2014/main" id="{4DADE15A-3A03-4CB3-A3A9-2A409B206270}"/>
-              </a:ext>
-            </a:extLst>
-          </p:cNvPr>
-          <p:cNvSpPr>
-            <a:spLocks noGrp="1"/>
-          </p:cNvSpPr>
-          <p:nvPr>
-            <p:ph type="title"/>
-          </p:nvPr>
-        </p:nvSpPr>
-        <p:spPr/>
-        <p:txBody>
-          <a:bodyPr/>
-          <a:lstStyle/>
-          <a:p>
-            <a:r>
-              <a:rPr lang="en-US" dirty="0"/>
-              <a:t>Introduction</a:t>
-            </a:r>
-          </a:p>
-        </p:txBody>
-      </p:sp>
-      <p:sp>
-        <p:nvSpPr>
-          <p:cNvPr id="5" name="Inhaltsplatzhalter 4">
-            <a:extLst>
-              <a:ext uri="{FF2B5EF4-FFF2-40B4-BE49-F238E27FC236}">
-                <a16:creationId xmlns:a16="http://schemas.microsoft.com/office/drawing/2014/main" id="{164AC5CF-10EE-4132-86BF-F193601083EE}"/>
-              </a:ext>
-            </a:extLst>
-          </p:cNvPr>
-          <p:cNvSpPr>
-            <a:spLocks noGrp="1"/>
-          </p:cNvSpPr>
-          <p:nvPr>
-            <p:ph idx="1"/>
-          </p:nvPr>
-        </p:nvSpPr>
-        <p:spPr/>
-        <p:txBody>
-          <a:bodyPr/>
-          <a:lstStyle/>
-          <a:p>
-            <a:r>
-              <a:rPr lang="en-US" dirty="0"/>
-              <a:t>Service discovery can be used for many tasks:</a:t>
-            </a:r>
-          </a:p>
-          <a:p>
-            <a:pPr lvl="1"/>
-            <a:r>
-              <a:rPr lang="en-US" dirty="0"/>
-              <a:t>Service resolution for cross service communication</a:t>
-            </a:r>
-          </a:p>
-          <a:p>
-            <a:pPr lvl="1"/>
-            <a:r>
-              <a:rPr lang="en-US" dirty="0"/>
-              <a:t>Dynamic load balancing configuration</a:t>
-            </a:r>
-          </a:p>
-          <a:p>
-            <a:pPr lvl="1"/>
-            <a:r>
-              <a:rPr lang="en-US" dirty="0"/>
-              <a:t>Dynamic monitoring configuration</a:t>
-            </a:r>
-          </a:p>
-          <a:p>
-            <a:pPr lvl="1"/>
-            <a:r>
-              <a:rPr lang="en-US" dirty="0"/>
-              <a:t>…</a:t>
-            </a:r>
-          </a:p>
-          <a:p>
-            <a:r>
-              <a:rPr lang="en-US" dirty="0"/>
-              <a:t>Approaches:</a:t>
-            </a:r>
-          </a:p>
-          <a:p>
-            <a:pPr lvl="1"/>
-            <a:r>
-              <a:rPr lang="en-US" dirty="0"/>
-              <a:t>Static configuration files (forget about this…)</a:t>
-            </a:r>
-          </a:p>
-          <a:p>
-            <a:pPr lvl="1"/>
-            <a:r>
-              <a:rPr lang="en-US" dirty="0"/>
-              <a:t>DNS</a:t>
-            </a:r>
-          </a:p>
-          <a:p>
-            <a:pPr lvl="1"/>
-            <a:r>
-              <a:rPr lang="en-US" dirty="0"/>
-              <a:t>Dynamic solutions</a:t>
-            </a:r>
-          </a:p>
-          <a:p>
-            <a:r>
-              <a:rPr lang="en-US" dirty="0"/>
-              <a:t>Patterns:</a:t>
-            </a:r>
-          </a:p>
-          <a:p>
-            <a:pPr lvl="1"/>
-            <a:r>
-              <a:rPr lang="en-US" dirty="0"/>
-              <a:t>Client-side discovery</a:t>
-            </a:r>
-          </a:p>
-          <a:p>
-            <a:pPr lvl="1"/>
-            <a:r>
-              <a:rPr lang="en-US" dirty="0"/>
-              <a:t>Server-side discovery</a:t>
-            </a:r>
-          </a:p>
-          <a:p>
-            <a:r>
-              <a:rPr lang="en-US" dirty="0"/>
-              <a:t>Additionally a few products also include:</a:t>
-            </a:r>
-          </a:p>
-          <a:p>
-            <a:pPr lvl="1"/>
-            <a:r>
-              <a:rPr lang="en-US" dirty="0"/>
-              <a:t>Configuration stores</a:t>
-            </a:r>
-          </a:p>
-          <a:p>
-            <a:pPr lvl="1"/>
-            <a:r>
-              <a:rPr lang="en-US" dirty="0"/>
-              <a:t>Health checks (basically a kind of monitoring)</a:t>
-            </a:r>
-          </a:p>
-          <a:p>
-            <a:pPr lvl="1"/>
-            <a:r>
-              <a:rPr lang="en-US" dirty="0"/>
-              <a:t>Events on changes (e.g. new services, changes in the configuration store…)</a:t>
-            </a:r>
-          </a:p>
-        </p:txBody>
-      </p:sp>
-    </p:spTree>
-    <p:extLst>
-      <p:ext uri="{BB962C8B-B14F-4D97-AF65-F5344CB8AC3E}">
-        <p14:creationId xmlns:p14="http://schemas.microsoft.com/office/powerpoint/2010/main" val="3383403927"/>
       </p:ext>
     </p:extLst>
   </p:cSld>

</xml_diff>